<commit_message>
Added initial project implementation
</commit_message>
<xml_diff>
--- a/Presentation/Warehouse Management System.pptx
+++ b/Presentation/Warehouse Management System.pptx
@@ -10,10 +10,11 @@
     <p:sldId id="257" r:id="rId4"/>
     <p:sldId id="259" r:id="rId5"/>
     <p:sldId id="260" r:id="rId6"/>
-    <p:sldId id="263" r:id="rId7"/>
-    <p:sldId id="262" r:id="rId8"/>
-    <p:sldId id="261" r:id="rId9"/>
-    <p:sldId id="264" r:id="rId10"/>
+    <p:sldId id="265" r:id="rId7"/>
+    <p:sldId id="263" r:id="rId8"/>
+    <p:sldId id="262" r:id="rId9"/>
+    <p:sldId id="261" r:id="rId10"/>
+    <p:sldId id="264" r:id="rId11"/>
   </p:sldIdLst>
   <p:sldSz cx="12192000" cy="6858000"/>
   <p:notesSz cx="6858000" cy="9144000"/>
@@ -339,6 +340,9 @@
   <p:clrMapOvr>
     <a:masterClrMapping/>
   </p:clrMapOvr>
+  <p:transition spd="slow">
+    <p:push dir="u"/>
+  </p:transition>
 </p:sldLayout>
 </file>
 
@@ -539,6 +543,9 @@
   <p:clrMapOvr>
     <a:masterClrMapping/>
   </p:clrMapOvr>
+  <p:transition spd="slow">
+    <p:push dir="u"/>
+  </p:transition>
 </p:sldLayout>
 </file>
 
@@ -749,6 +756,9 @@
   <p:clrMapOvr>
     <a:masterClrMapping/>
   </p:clrMapOvr>
+  <p:transition spd="slow">
+    <p:push dir="u"/>
+  </p:transition>
 </p:sldLayout>
 </file>
 
@@ -949,6 +959,9 @@
   <p:clrMapOvr>
     <a:masterClrMapping/>
   </p:clrMapOvr>
+  <p:transition spd="slow">
+    <p:push dir="u"/>
+  </p:transition>
 </p:sldLayout>
 </file>
 
@@ -1225,6 +1238,9 @@
   <p:clrMapOvr>
     <a:masterClrMapping/>
   </p:clrMapOvr>
+  <p:transition spd="slow">
+    <p:push dir="u"/>
+  </p:transition>
 </p:sldLayout>
 </file>
 
@@ -1493,6 +1509,9 @@
   <p:clrMapOvr>
     <a:masterClrMapping/>
   </p:clrMapOvr>
+  <p:transition spd="slow">
+    <p:push dir="u"/>
+  </p:transition>
 </p:sldLayout>
 </file>
 
@@ -1908,6 +1927,9 @@
   <p:clrMapOvr>
     <a:masterClrMapping/>
   </p:clrMapOvr>
+  <p:transition spd="slow">
+    <p:push dir="u"/>
+  </p:transition>
 </p:sldLayout>
 </file>
 
@@ -2050,6 +2072,9 @@
   <p:clrMapOvr>
     <a:masterClrMapping/>
   </p:clrMapOvr>
+  <p:transition spd="slow">
+    <p:push dir="u"/>
+  </p:transition>
 </p:sldLayout>
 </file>
 
@@ -2163,6 +2188,9 @@
   <p:clrMapOvr>
     <a:masterClrMapping/>
   </p:clrMapOvr>
+  <p:transition spd="slow">
+    <p:push dir="u"/>
+  </p:transition>
 </p:sldLayout>
 </file>
 
@@ -2476,6 +2504,9 @@
   <p:clrMapOvr>
     <a:masterClrMapping/>
   </p:clrMapOvr>
+  <p:transition spd="slow">
+    <p:push dir="u"/>
+  </p:transition>
 </p:sldLayout>
 </file>
 
@@ -2765,6 +2796,9 @@
   <p:clrMapOvr>
     <a:masterClrMapping/>
   </p:clrMapOvr>
+  <p:transition spd="slow">
+    <p:push dir="u"/>
+  </p:transition>
 </p:sldLayout>
 </file>
 
@@ -3055,6 +3089,9 @@
     <p:sldLayoutId id="2147483658" r:id="rId10"/>
     <p:sldLayoutId id="2147483659" r:id="rId11"/>
   </p:sldLayoutIdLst>
+  <p:transition spd="slow">
+    <p:push dir="u"/>
+  </p:transition>
   <p:txStyles>
     <p:titleStyle>
       <a:lvl1pPr algn="l" defTabSz="914400" rtl="0" eaLnBrk="1" latinLnBrk="0" hangingPunct="1">
@@ -3536,6 +3573,165 @@
   <p:clrMapOvr>
     <a:masterClrMapping/>
   </p:clrMapOvr>
+  <mc:AlternateContent xmlns:mc="http://schemas.openxmlformats.org/markup-compatibility/2006">
+    <mc:Choice xmlns:p14="http://schemas.microsoft.com/office/powerpoint/2010/main" Requires="p14">
+      <p:transition spd="med" p14:dur="700">
+        <p:fade/>
+      </p:transition>
+    </mc:Choice>
+    <mc:Fallback>
+      <p:transition spd="med">
+        <p:fade/>
+      </p:transition>
+    </mc:Fallback>
+  </mc:AlternateContent>
+</p:sld>
+</file>
+
+<file path=ppt/slides/slide10.xml><?xml version="1.0" encoding="utf-8"?>
+<p:sld xmlns:a="http://schemas.openxmlformats.org/drawingml/2006/main" xmlns:r="http://schemas.openxmlformats.org/officeDocument/2006/relationships" xmlns:p="http://schemas.openxmlformats.org/presentationml/2006/main">
+  <p:cSld>
+    <p:spTree>
+      <p:nvGrpSpPr>
+        <p:cNvPr id="1" name=""/>
+        <p:cNvGrpSpPr/>
+        <p:nvPr/>
+      </p:nvGrpSpPr>
+      <p:grpSpPr>
+        <a:xfrm>
+          <a:off x="0" y="0"/>
+          <a:ext cx="0" cy="0"/>
+          <a:chOff x="0" y="0"/>
+          <a:chExt cx="0" cy="0"/>
+        </a:xfrm>
+      </p:grpSpPr>
+      <p:sp>
+        <p:nvSpPr>
+          <p:cNvPr id="2" name="Title 1">
+            <a:extLst>
+              <a:ext uri="{FF2B5EF4-FFF2-40B4-BE49-F238E27FC236}">
+                <a16:creationId xmlns:a16="http://schemas.microsoft.com/office/drawing/2014/main" id="{27BBE130-9BF7-4FBD-9C94-250DE71FC7CF}"/>
+              </a:ext>
+            </a:extLst>
+          </p:cNvPr>
+          <p:cNvSpPr>
+            <a:spLocks noGrp="1"/>
+          </p:cNvSpPr>
+          <p:nvPr>
+            <p:ph type="title"/>
+          </p:nvPr>
+        </p:nvSpPr>
+        <p:spPr/>
+        <p:txBody>
+          <a:bodyPr/>
+          <a:lstStyle/>
+          <a:p>
+            <a:r>
+              <a:rPr lang="en-US" dirty="0"/>
+              <a:t>Payment</a:t>
+            </a:r>
+            <a:endParaRPr lang="bs-Latn-BA" dirty="0"/>
+          </a:p>
+        </p:txBody>
+      </p:sp>
+      <p:sp>
+        <p:nvSpPr>
+          <p:cNvPr id="3" name="Content Placeholder 2">
+            <a:extLst>
+              <a:ext uri="{FF2B5EF4-FFF2-40B4-BE49-F238E27FC236}">
+                <a16:creationId xmlns:a16="http://schemas.microsoft.com/office/drawing/2014/main" id="{E6F45B40-1A23-48EF-A942-AE258B14BA05}"/>
+              </a:ext>
+            </a:extLst>
+          </p:cNvPr>
+          <p:cNvSpPr>
+            <a:spLocks noGrp="1"/>
+          </p:cNvSpPr>
+          <p:nvPr>
+            <p:ph sz="half" idx="1"/>
+          </p:nvPr>
+        </p:nvSpPr>
+        <p:spPr/>
+        <p:txBody>
+          <a:bodyPr/>
+          <a:lstStyle/>
+          <a:p>
+            <a:r>
+              <a:rPr lang="en-US" dirty="0" err="1"/>
+              <a:t>Skladište</a:t>
+            </a:r>
+            <a:r>
+              <a:rPr lang="en-US" dirty="0"/>
+              <a:t> se mora </a:t>
+            </a:r>
+            <a:r>
+              <a:rPr lang="en-US" dirty="0" err="1"/>
+              <a:t>plaćati</a:t>
+            </a:r>
+            <a:r>
+              <a:rPr lang="en-US" dirty="0"/>
+              <a:t>...</a:t>
+            </a:r>
+          </a:p>
+          <a:p>
+            <a:r>
+              <a:rPr lang="en-US" dirty="0" err="1"/>
+              <a:t>Kako</a:t>
+            </a:r>
+            <a:r>
+              <a:rPr lang="en-US" dirty="0"/>
+              <a:t>?</a:t>
+            </a:r>
+          </a:p>
+        </p:txBody>
+      </p:sp>
+      <p:pic>
+        <p:nvPicPr>
+          <p:cNvPr id="6" name="Content Placeholder 5">
+            <a:extLst>
+              <a:ext uri="{FF2B5EF4-FFF2-40B4-BE49-F238E27FC236}">
+                <a16:creationId xmlns:a16="http://schemas.microsoft.com/office/drawing/2014/main" id="{ADE6C0EE-DF7C-4E85-9E43-166B8F4E2378}"/>
+              </a:ext>
+            </a:extLst>
+          </p:cNvPr>
+          <p:cNvPicPr>
+            <a:picLocks noGrp="1" noChangeAspect="1"/>
+          </p:cNvPicPr>
+          <p:nvPr>
+            <p:ph sz="half" idx="2"/>
+          </p:nvPr>
+        </p:nvPicPr>
+        <p:blipFill>
+          <a:blip r:embed="rId2">
+            <a:extLst>
+              <a:ext uri="{28A0092B-C50C-407E-A947-70E740481C1C}">
+                <a14:useLocalDpi xmlns:a14="http://schemas.microsoft.com/office/drawing/2010/main" val="0"/>
+              </a:ext>
+            </a:extLst>
+          </a:blip>
+          <a:stretch>
+            <a:fillRect/>
+          </a:stretch>
+        </p:blipFill>
+        <p:spPr>
+          <a:xfrm rot="1590750">
+            <a:off x="7238300" y="2834239"/>
+            <a:ext cx="3049400" cy="2334110"/>
+          </a:xfrm>
+        </p:spPr>
+      </p:pic>
+    </p:spTree>
+    <p:extLst>
+      <p:ext uri="{BB962C8B-B14F-4D97-AF65-F5344CB8AC3E}">
+        <p14:creationId xmlns:p14="http://schemas.microsoft.com/office/powerpoint/2010/main" val="2445151281"/>
+      </p:ext>
+    </p:extLst>
+  </p:cSld>
+  <p:clrMapOvr>
+    <a:masterClrMapping/>
+  </p:clrMapOvr>
+  <p:transition spd="slow">
+    <p:push dir="u"/>
+  </p:transition>
 </p:sld>
 </file>
 
@@ -3643,6 +3839,9 @@
   <p:clrMapOvr>
     <a:masterClrMapping/>
   </p:clrMapOvr>
+  <p:transition spd="slow">
+    <p:push dir="u"/>
+  </p:transition>
 </p:sld>
 </file>
 
@@ -3815,6 +4014,9 @@
   <p:clrMapOvr>
     <a:masterClrMapping/>
   </p:clrMapOvr>
+  <p:transition spd="slow">
+    <p:push dir="u"/>
+  </p:transition>
 </p:sld>
 </file>
 
@@ -4018,6 +4220,9 @@
   <p:clrMapOvr>
     <a:masterClrMapping/>
   </p:clrMapOvr>
+  <p:transition spd="slow">
+    <p:push dir="u"/>
+  </p:transition>
 </p:sld>
 </file>
 
@@ -4184,8 +4389,8 @@
         </p:blipFill>
         <p:spPr>
           <a:xfrm>
-            <a:off x="2592456" y="3745062"/>
-            <a:ext cx="7007088" cy="2413183"/>
+            <a:off x="2592456" y="3769542"/>
+            <a:ext cx="7007088" cy="2364223"/>
           </a:xfrm>
         </p:spPr>
       </p:pic>
@@ -4199,10 +4404,149 @@
   <p:clrMapOvr>
     <a:masterClrMapping/>
   </p:clrMapOvr>
+  <p:transition spd="slow">
+    <p:push dir="u"/>
+  </p:transition>
 </p:sld>
 </file>
 
 <file path=ppt/slides/slide6.xml><?xml version="1.0" encoding="utf-8"?>
+<p:sld xmlns:a="http://schemas.openxmlformats.org/drawingml/2006/main" xmlns:r="http://schemas.openxmlformats.org/officeDocument/2006/relationships" xmlns:p="http://schemas.openxmlformats.org/presentationml/2006/main">
+  <p:cSld>
+    <p:spTree>
+      <p:nvGrpSpPr>
+        <p:cNvPr id="1" name=""/>
+        <p:cNvGrpSpPr/>
+        <p:nvPr/>
+      </p:nvGrpSpPr>
+      <p:grpSpPr>
+        <a:xfrm>
+          <a:off x="0" y="0"/>
+          <a:ext cx="0" cy="0"/>
+          <a:chOff x="0" y="0"/>
+          <a:chExt cx="0" cy="0"/>
+        </a:xfrm>
+      </p:grpSpPr>
+      <p:sp>
+        <p:nvSpPr>
+          <p:cNvPr id="4" name="Title 3">
+            <a:extLst>
+              <a:ext uri="{FF2B5EF4-FFF2-40B4-BE49-F238E27FC236}">
+                <a16:creationId xmlns:a16="http://schemas.microsoft.com/office/drawing/2014/main" id="{D04E6CE5-6184-4AFE-B33E-8EA975EAFD56}"/>
+              </a:ext>
+            </a:extLst>
+          </p:cNvPr>
+          <p:cNvSpPr>
+            <a:spLocks noGrp="1"/>
+          </p:cNvSpPr>
+          <p:nvPr>
+            <p:ph type="title"/>
+          </p:nvPr>
+        </p:nvSpPr>
+        <p:spPr/>
+        <p:txBody>
+          <a:bodyPr/>
+          <a:lstStyle/>
+          <a:p>
+            <a:r>
+              <a:rPr lang="en-US" dirty="0"/>
+              <a:t>Observer?</a:t>
+            </a:r>
+            <a:endParaRPr lang="bs-Latn-BA" dirty="0"/>
+          </a:p>
+        </p:txBody>
+      </p:sp>
+      <p:sp>
+        <p:nvSpPr>
+          <p:cNvPr id="5" name="Content Placeholder 4">
+            <a:extLst>
+              <a:ext uri="{FF2B5EF4-FFF2-40B4-BE49-F238E27FC236}">
+                <a16:creationId xmlns:a16="http://schemas.microsoft.com/office/drawing/2014/main" id="{3EDAA09A-AB66-4EE8-91C2-88C520798EEF}"/>
+              </a:ext>
+            </a:extLst>
+          </p:cNvPr>
+          <p:cNvSpPr>
+            <a:spLocks noGrp="1"/>
+          </p:cNvSpPr>
+          <p:nvPr>
+            <p:ph sz="half" idx="1"/>
+          </p:nvPr>
+        </p:nvSpPr>
+        <p:spPr>
+          <a:xfrm>
+            <a:off x="838199" y="1825625"/>
+            <a:ext cx="10515599" cy="1784500"/>
+          </a:xfrm>
+        </p:spPr>
+        <p:txBody>
+          <a:bodyPr/>
+          <a:lstStyle/>
+          <a:p>
+            <a:r>
+              <a:rPr lang="en-US" dirty="0"/>
+              <a:t>Notifier – observable</a:t>
+            </a:r>
+          </a:p>
+          <a:p>
+            <a:r>
+              <a:rPr lang="en-US" dirty="0"/>
+              <a:t>User – observer</a:t>
+            </a:r>
+          </a:p>
+        </p:txBody>
+      </p:sp>
+      <p:pic>
+        <p:nvPicPr>
+          <p:cNvPr id="8" name="Content Placeholder 7">
+            <a:extLst>
+              <a:ext uri="{FF2B5EF4-FFF2-40B4-BE49-F238E27FC236}">
+                <a16:creationId xmlns:a16="http://schemas.microsoft.com/office/drawing/2014/main" id="{CE8F200C-234C-41BC-96AC-DB003D26EA8B}"/>
+              </a:ext>
+            </a:extLst>
+          </p:cNvPr>
+          <p:cNvPicPr>
+            <a:picLocks noGrp="1" noChangeAspect="1"/>
+          </p:cNvPicPr>
+          <p:nvPr>
+            <p:ph sz="half" idx="2"/>
+          </p:nvPr>
+        </p:nvPicPr>
+        <p:blipFill>
+          <a:blip r:embed="rId2">
+            <a:extLst>
+              <a:ext uri="{28A0092B-C50C-407E-A947-70E740481C1C}">
+                <a14:useLocalDpi xmlns:a14="http://schemas.microsoft.com/office/drawing/2010/main" val="0"/>
+              </a:ext>
+            </a:extLst>
+          </a:blip>
+          <a:stretch>
+            <a:fillRect/>
+          </a:stretch>
+        </p:blipFill>
+        <p:spPr>
+          <a:xfrm>
+            <a:off x="2592456" y="3769542"/>
+            <a:ext cx="7007088" cy="2364223"/>
+          </a:xfrm>
+        </p:spPr>
+      </p:pic>
+    </p:spTree>
+    <p:extLst>
+      <p:ext uri="{BB962C8B-B14F-4D97-AF65-F5344CB8AC3E}">
+        <p14:creationId xmlns:p14="http://schemas.microsoft.com/office/powerpoint/2010/main" val="3172964261"/>
+      </p:ext>
+    </p:extLst>
+  </p:cSld>
+  <p:clrMapOvr>
+    <a:masterClrMapping/>
+  </p:clrMapOvr>
+  <p:transition spd="slow">
+    <p:push dir="u"/>
+  </p:transition>
+</p:sld>
+</file>
+
+<file path=ppt/slides/slide7.xml><?xml version="1.0" encoding="utf-8"?>
 <p:sld xmlns:a="http://schemas.openxmlformats.org/drawingml/2006/main" xmlns:r="http://schemas.openxmlformats.org/officeDocument/2006/relationships" xmlns:p="http://schemas.openxmlformats.org/presentationml/2006/main">
   <p:cSld>
     <p:spTree>
@@ -4405,10 +4749,13 @@
   <p:clrMapOvr>
     <a:masterClrMapping/>
   </p:clrMapOvr>
+  <p:transition spd="slow">
+    <p:push dir="u"/>
+  </p:transition>
 </p:sld>
 </file>
 
-<file path=ppt/slides/slide7.xml><?xml version="1.0" encoding="utf-8"?>
+<file path=ppt/slides/slide8.xml><?xml version="1.0" encoding="utf-8"?>
 <p:sld xmlns:a="http://schemas.openxmlformats.org/drawingml/2006/main" xmlns:r="http://schemas.openxmlformats.org/officeDocument/2006/relationships" xmlns:p="http://schemas.openxmlformats.org/presentationml/2006/main">
   <p:cSld>
     <p:spTree>
@@ -4644,10 +4991,13 @@
   <p:clrMapOvr>
     <a:masterClrMapping/>
   </p:clrMapOvr>
+  <p:transition spd="slow">
+    <p:push dir="u"/>
+  </p:transition>
 </p:sld>
 </file>
 
-<file path=ppt/slides/slide8.xml><?xml version="1.0" encoding="utf-8"?>
+<file path=ppt/slides/slide9.xml><?xml version="1.0" encoding="utf-8"?>
 <p:sld xmlns:a="http://schemas.openxmlformats.org/drawingml/2006/main" xmlns:r="http://schemas.openxmlformats.org/officeDocument/2006/relationships" xmlns:p="http://schemas.openxmlformats.org/presentationml/2006/main">
   <p:cSld>
     <p:spTree>
@@ -4808,150 +5158,9 @@
   <p:clrMapOvr>
     <a:masterClrMapping/>
   </p:clrMapOvr>
-</p:sld>
-</file>
-
-<file path=ppt/slides/slide9.xml><?xml version="1.0" encoding="utf-8"?>
-<p:sld xmlns:a="http://schemas.openxmlformats.org/drawingml/2006/main" xmlns:r="http://schemas.openxmlformats.org/officeDocument/2006/relationships" xmlns:p="http://schemas.openxmlformats.org/presentationml/2006/main">
-  <p:cSld>
-    <p:spTree>
-      <p:nvGrpSpPr>
-        <p:cNvPr id="1" name=""/>
-        <p:cNvGrpSpPr/>
-        <p:nvPr/>
-      </p:nvGrpSpPr>
-      <p:grpSpPr>
-        <a:xfrm>
-          <a:off x="0" y="0"/>
-          <a:ext cx="0" cy="0"/>
-          <a:chOff x="0" y="0"/>
-          <a:chExt cx="0" cy="0"/>
-        </a:xfrm>
-      </p:grpSpPr>
-      <p:sp>
-        <p:nvSpPr>
-          <p:cNvPr id="2" name="Title 1">
-            <a:extLst>
-              <a:ext uri="{FF2B5EF4-FFF2-40B4-BE49-F238E27FC236}">
-                <a16:creationId xmlns:a16="http://schemas.microsoft.com/office/drawing/2014/main" id="{27BBE130-9BF7-4FBD-9C94-250DE71FC7CF}"/>
-              </a:ext>
-            </a:extLst>
-          </p:cNvPr>
-          <p:cNvSpPr>
-            <a:spLocks noGrp="1"/>
-          </p:cNvSpPr>
-          <p:nvPr>
-            <p:ph type="title"/>
-          </p:nvPr>
-        </p:nvSpPr>
-        <p:spPr/>
-        <p:txBody>
-          <a:bodyPr/>
-          <a:lstStyle/>
-          <a:p>
-            <a:r>
-              <a:rPr lang="en-US" dirty="0"/>
-              <a:t>Payment</a:t>
-            </a:r>
-            <a:endParaRPr lang="bs-Latn-BA" dirty="0"/>
-          </a:p>
-        </p:txBody>
-      </p:sp>
-      <p:sp>
-        <p:nvSpPr>
-          <p:cNvPr id="3" name="Content Placeholder 2">
-            <a:extLst>
-              <a:ext uri="{FF2B5EF4-FFF2-40B4-BE49-F238E27FC236}">
-                <a16:creationId xmlns:a16="http://schemas.microsoft.com/office/drawing/2014/main" id="{E6F45B40-1A23-48EF-A942-AE258B14BA05}"/>
-              </a:ext>
-            </a:extLst>
-          </p:cNvPr>
-          <p:cNvSpPr>
-            <a:spLocks noGrp="1"/>
-          </p:cNvSpPr>
-          <p:nvPr>
-            <p:ph sz="half" idx="1"/>
-          </p:nvPr>
-        </p:nvSpPr>
-        <p:spPr/>
-        <p:txBody>
-          <a:bodyPr/>
-          <a:lstStyle/>
-          <a:p>
-            <a:r>
-              <a:rPr lang="en-US" dirty="0" err="1"/>
-              <a:t>Skladišta</a:t>
-            </a:r>
-            <a:r>
-              <a:rPr lang="en-US" dirty="0"/>
-              <a:t> se mora </a:t>
-            </a:r>
-            <a:r>
-              <a:rPr lang="en-US" dirty="0" err="1"/>
-              <a:t>plaćati</a:t>
-            </a:r>
-            <a:r>
-              <a:rPr lang="en-US" dirty="0"/>
-              <a:t>...</a:t>
-            </a:r>
-          </a:p>
-          <a:p>
-            <a:r>
-              <a:rPr lang="en-US" dirty="0" err="1"/>
-              <a:t>Kako</a:t>
-            </a:r>
-            <a:r>
-              <a:rPr lang="en-US" dirty="0"/>
-              <a:t>?</a:t>
-            </a:r>
-          </a:p>
-        </p:txBody>
-      </p:sp>
-      <p:pic>
-        <p:nvPicPr>
-          <p:cNvPr id="6" name="Content Placeholder 5">
-            <a:extLst>
-              <a:ext uri="{FF2B5EF4-FFF2-40B4-BE49-F238E27FC236}">
-                <a16:creationId xmlns:a16="http://schemas.microsoft.com/office/drawing/2014/main" id="{ADE6C0EE-DF7C-4E85-9E43-166B8F4E2378}"/>
-              </a:ext>
-            </a:extLst>
-          </p:cNvPr>
-          <p:cNvPicPr>
-            <a:picLocks noGrp="1" noChangeAspect="1"/>
-          </p:cNvPicPr>
-          <p:nvPr>
-            <p:ph sz="half" idx="2"/>
-          </p:nvPr>
-        </p:nvPicPr>
-        <p:blipFill>
-          <a:blip r:embed="rId2">
-            <a:extLst>
-              <a:ext uri="{28A0092B-C50C-407E-A947-70E740481C1C}">
-                <a14:useLocalDpi xmlns:a14="http://schemas.microsoft.com/office/drawing/2010/main" val="0"/>
-              </a:ext>
-            </a:extLst>
-          </a:blip>
-          <a:stretch>
-            <a:fillRect/>
-          </a:stretch>
-        </p:blipFill>
-        <p:spPr>
-          <a:xfrm rot="1590750">
-            <a:off x="7238300" y="2834239"/>
-            <a:ext cx="3049400" cy="2334110"/>
-          </a:xfrm>
-        </p:spPr>
-      </p:pic>
-    </p:spTree>
-    <p:extLst>
-      <p:ext uri="{BB962C8B-B14F-4D97-AF65-F5344CB8AC3E}">
-        <p14:creationId xmlns:p14="http://schemas.microsoft.com/office/powerpoint/2010/main" val="2445151281"/>
-      </p:ext>
-    </p:extLst>
-  </p:cSld>
-  <p:clrMapOvr>
-    <a:masterClrMapping/>
-  </p:clrMapOvr>
+  <p:transition spd="slow">
+    <p:push dir="u"/>
+  </p:transition>
 </p:sld>
 </file>
 

</xml_diff>